<commit_message>
checked in Code for regional
</commit_message>
<xml_diff>
--- a/Presentations/Unearthed Innovation Project - Rising Stars.pptx
+++ b/Presentations/Unearthed Innovation Project - Rising Stars.pptx
@@ -5,25 +5,26 @@
     <p:sldMasterId id="2147483707" r:id="rId1"/>
   </p:sldMasterIdLst>
   <p:notesMasterIdLst>
-    <p:notesMasterId r:id="rId18"/>
+    <p:notesMasterId r:id="rId19"/>
   </p:notesMasterIdLst>
   <p:sldIdLst>
     <p:sldId id="256" r:id="rId2"/>
     <p:sldId id="270" r:id="rId3"/>
     <p:sldId id="257" r:id="rId4"/>
-    <p:sldId id="259" r:id="rId5"/>
-    <p:sldId id="258" r:id="rId6"/>
-    <p:sldId id="262" r:id="rId7"/>
-    <p:sldId id="263" r:id="rId8"/>
-    <p:sldId id="264" r:id="rId9"/>
-    <p:sldId id="266" r:id="rId10"/>
-    <p:sldId id="265" r:id="rId11"/>
-    <p:sldId id="261" r:id="rId12"/>
-    <p:sldId id="267" r:id="rId13"/>
-    <p:sldId id="268" r:id="rId14"/>
-    <p:sldId id="269" r:id="rId15"/>
-    <p:sldId id="271" r:id="rId16"/>
-    <p:sldId id="272" r:id="rId17"/>
+    <p:sldId id="273" r:id="rId5"/>
+    <p:sldId id="259" r:id="rId6"/>
+    <p:sldId id="258" r:id="rId7"/>
+    <p:sldId id="262" r:id="rId8"/>
+    <p:sldId id="263" r:id="rId9"/>
+    <p:sldId id="264" r:id="rId10"/>
+    <p:sldId id="266" r:id="rId11"/>
+    <p:sldId id="265" r:id="rId12"/>
+    <p:sldId id="261" r:id="rId13"/>
+    <p:sldId id="267" r:id="rId14"/>
+    <p:sldId id="268" r:id="rId15"/>
+    <p:sldId id="269" r:id="rId16"/>
+    <p:sldId id="271" r:id="rId17"/>
+    <p:sldId id="272" r:id="rId18"/>
   </p:sldIdLst>
   <p:sldSz cx="12192000" cy="6858000"/>
   <p:notesSz cx="6858000" cy="9144000"/>
@@ -224,7 +225,7 @@
           <a:p>
             <a:fld id="{C18FD63A-F8FC-4A0C-8540-00C7AED4F48E}" type="datetimeFigureOut">
               <a:rPr lang="en-US" smtClean="0"/>
-              <a:t>11/30/2025</a:t>
+              <a:t>12/12/2025</a:t>
             </a:fld>
             <a:endParaRPr lang="en-US"/>
           </a:p>
@@ -646,7 +647,7 @@
           <a:p>
             <a:fld id="{2F4228F8-FB73-46B0-A250-E6C5C0B176A9}" type="slidenum">
               <a:rPr lang="en-US" smtClean="0"/>
-              <a:t>10</a:t>
+              <a:t>11</a:t>
             </a:fld>
             <a:endParaRPr lang="en-US"/>
           </a:p>
@@ -733,7 +734,7 @@
           <a:p>
             <a:fld id="{2F4228F8-FB73-46B0-A250-E6C5C0B176A9}" type="slidenum">
               <a:rPr lang="en-US" smtClean="0"/>
-              <a:t>11</a:t>
+              <a:t>12</a:t>
             </a:fld>
             <a:endParaRPr lang="en-US"/>
           </a:p>
@@ -820,7 +821,7 @@
           <a:p>
             <a:fld id="{2F4228F8-FB73-46B0-A250-E6C5C0B176A9}" type="slidenum">
               <a:rPr lang="en-US" smtClean="0"/>
-              <a:t>12</a:t>
+              <a:t>13</a:t>
             </a:fld>
             <a:endParaRPr lang="en-US"/>
           </a:p>
@@ -907,7 +908,7 @@
           <a:p>
             <a:fld id="{2F4228F8-FB73-46B0-A250-E6C5C0B176A9}" type="slidenum">
               <a:rPr lang="en-US" smtClean="0"/>
-              <a:t>13</a:t>
+              <a:t>14</a:t>
             </a:fld>
             <a:endParaRPr lang="en-US"/>
           </a:p>
@@ -994,7 +995,7 @@
           <a:p>
             <a:fld id="{2F4228F8-FB73-46B0-A250-E6C5C0B176A9}" type="slidenum">
               <a:rPr lang="en-US" smtClean="0"/>
-              <a:t>14</a:t>
+              <a:t>15</a:t>
             </a:fld>
             <a:endParaRPr lang="en-US"/>
           </a:p>
@@ -1255,7 +1256,7 @@
           <a:p>
             <a:fld id="{2F4228F8-FB73-46B0-A250-E6C5C0B176A9}" type="slidenum">
               <a:rPr lang="en-US" smtClean="0"/>
-              <a:t>4</a:t>
+              <a:t>5</a:t>
             </a:fld>
             <a:endParaRPr lang="en-US"/>
           </a:p>
@@ -1342,7 +1343,7 @@
           <a:p>
             <a:fld id="{2F4228F8-FB73-46B0-A250-E6C5C0B176A9}" type="slidenum">
               <a:rPr lang="en-US" smtClean="0"/>
-              <a:t>5</a:t>
+              <a:t>6</a:t>
             </a:fld>
             <a:endParaRPr lang="en-US"/>
           </a:p>
@@ -1429,7 +1430,7 @@
           <a:p>
             <a:fld id="{2F4228F8-FB73-46B0-A250-E6C5C0B176A9}" type="slidenum">
               <a:rPr lang="en-US" smtClean="0"/>
-              <a:t>6</a:t>
+              <a:t>7</a:t>
             </a:fld>
             <a:endParaRPr lang="en-US"/>
           </a:p>
@@ -1516,7 +1517,7 @@
           <a:p>
             <a:fld id="{2F4228F8-FB73-46B0-A250-E6C5C0B176A9}" type="slidenum">
               <a:rPr lang="en-US" smtClean="0"/>
-              <a:t>7</a:t>
+              <a:t>8</a:t>
             </a:fld>
             <a:endParaRPr lang="en-US"/>
           </a:p>
@@ -1603,7 +1604,7 @@
           <a:p>
             <a:fld id="{2F4228F8-FB73-46B0-A250-E6C5C0B176A9}" type="slidenum">
               <a:rPr lang="en-US" smtClean="0"/>
-              <a:t>8</a:t>
+              <a:t>9</a:t>
             </a:fld>
             <a:endParaRPr lang="en-US"/>
           </a:p>
@@ -1690,7 +1691,7 @@
           <a:p>
             <a:fld id="{2F4228F8-FB73-46B0-A250-E6C5C0B176A9}" type="slidenum">
               <a:rPr lang="en-US" smtClean="0"/>
-              <a:t>9</a:t>
+              <a:t>10</a:t>
             </a:fld>
             <a:endParaRPr lang="en-US"/>
           </a:p>
@@ -2431,7 +2432,7 @@
           <a:p>
             <a:fld id="{8214EFA7-94EC-4BC8-BC85-3E595F55699A}" type="datetimeFigureOut">
               <a:rPr lang="en-US" smtClean="0"/>
-              <a:t>11/30/2025</a:t>
+              <a:t>12/12/2025</a:t>
             </a:fld>
             <a:endParaRPr lang="en-US"/>
           </a:p>
@@ -2682,7 +2683,7 @@
           <a:p>
             <a:fld id="{8214EFA7-94EC-4BC8-BC85-3E595F55699A}" type="datetimeFigureOut">
               <a:rPr lang="en-US" smtClean="0"/>
-              <a:t>11/30/2025</a:t>
+              <a:t>12/12/2025</a:t>
             </a:fld>
             <a:endParaRPr lang="en-US"/>
           </a:p>
@@ -2996,7 +2997,7 @@
           <a:p>
             <a:fld id="{8214EFA7-94EC-4BC8-BC85-3E595F55699A}" type="datetimeFigureOut">
               <a:rPr lang="en-US" smtClean="0"/>
-              <a:t>11/30/2025</a:t>
+              <a:t>12/12/2025</a:t>
             </a:fld>
             <a:endParaRPr lang="en-US"/>
           </a:p>
@@ -3337,7 +3338,7 @@
           <a:p>
             <a:fld id="{8214EFA7-94EC-4BC8-BC85-3E595F55699A}" type="datetimeFigureOut">
               <a:rPr lang="en-US" smtClean="0"/>
-              <a:t>11/30/2025</a:t>
+              <a:t>12/12/2025</a:t>
             </a:fld>
             <a:endParaRPr lang="en-US"/>
           </a:p>
@@ -3651,7 +3652,7 @@
           <a:p>
             <a:fld id="{8214EFA7-94EC-4BC8-BC85-3E595F55699A}" type="datetimeFigureOut">
               <a:rPr lang="en-US" smtClean="0"/>
-              <a:t>11/30/2025</a:t>
+              <a:t>12/12/2025</a:t>
             </a:fld>
             <a:endParaRPr lang="en-US"/>
           </a:p>
@@ -4044,7 +4045,7 @@
           <a:p>
             <a:fld id="{8214EFA7-94EC-4BC8-BC85-3E595F55699A}" type="datetimeFigureOut">
               <a:rPr lang="en-US" smtClean="0"/>
-              <a:t>11/30/2025</a:t>
+              <a:t>12/12/2025</a:t>
             </a:fld>
             <a:endParaRPr lang="en-US"/>
           </a:p>
@@ -4214,7 +4215,7 @@
           <a:p>
             <a:fld id="{8214EFA7-94EC-4BC8-BC85-3E595F55699A}" type="datetimeFigureOut">
               <a:rPr lang="en-US" smtClean="0"/>
-              <a:t>11/30/2025</a:t>
+              <a:t>12/12/2025</a:t>
             </a:fld>
             <a:endParaRPr lang="en-US"/>
           </a:p>
@@ -4394,7 +4395,7 @@
           <a:p>
             <a:fld id="{8214EFA7-94EC-4BC8-BC85-3E595F55699A}" type="datetimeFigureOut">
               <a:rPr lang="en-US" smtClean="0"/>
-              <a:t>11/30/2025</a:t>
+              <a:t>12/12/2025</a:t>
             </a:fld>
             <a:endParaRPr lang="en-US"/>
           </a:p>
@@ -4570,7 +4571,7 @@
           <a:p>
             <a:fld id="{8214EFA7-94EC-4BC8-BC85-3E595F55699A}" type="datetimeFigureOut">
               <a:rPr lang="en-US" smtClean="0"/>
-              <a:t>11/30/2025</a:t>
+              <a:t>12/12/2025</a:t>
             </a:fld>
             <a:endParaRPr lang="en-US"/>
           </a:p>
@@ -4817,7 +4818,7 @@
           <a:p>
             <a:fld id="{8214EFA7-94EC-4BC8-BC85-3E595F55699A}" type="datetimeFigureOut">
               <a:rPr lang="en-US" smtClean="0"/>
-              <a:t>11/30/2025</a:t>
+              <a:t>12/12/2025</a:t>
             </a:fld>
             <a:endParaRPr lang="en-US"/>
           </a:p>
@@ -5049,7 +5050,7 @@
           <a:p>
             <a:fld id="{8214EFA7-94EC-4BC8-BC85-3E595F55699A}" type="datetimeFigureOut">
               <a:rPr lang="en-US" smtClean="0"/>
-              <a:t>11/30/2025</a:t>
+              <a:t>12/12/2025</a:t>
             </a:fld>
             <a:endParaRPr lang="en-US"/>
           </a:p>
@@ -5423,7 +5424,7 @@
           <a:p>
             <a:fld id="{8214EFA7-94EC-4BC8-BC85-3E595F55699A}" type="datetimeFigureOut">
               <a:rPr lang="en-US" smtClean="0"/>
-              <a:t>11/30/2025</a:t>
+              <a:t>12/12/2025</a:t>
             </a:fld>
             <a:endParaRPr lang="en-US"/>
           </a:p>
@@ -5546,7 +5547,7 @@
           <a:p>
             <a:fld id="{8214EFA7-94EC-4BC8-BC85-3E595F55699A}" type="datetimeFigureOut">
               <a:rPr lang="en-US" smtClean="0"/>
-              <a:t>11/30/2025</a:t>
+              <a:t>12/12/2025</a:t>
             </a:fld>
             <a:endParaRPr lang="en-US"/>
           </a:p>
@@ -5641,7 +5642,7 @@
           <a:p>
             <a:fld id="{8214EFA7-94EC-4BC8-BC85-3E595F55699A}" type="datetimeFigureOut">
               <a:rPr lang="en-US" smtClean="0"/>
-              <a:t>11/30/2025</a:t>
+              <a:t>12/12/2025</a:t>
             </a:fld>
             <a:endParaRPr lang="en-US"/>
           </a:p>
@@ -5896,7 +5897,7 @@
           <a:p>
             <a:fld id="{8214EFA7-94EC-4BC8-BC85-3E595F55699A}" type="datetimeFigureOut">
               <a:rPr lang="en-US" smtClean="0"/>
-              <a:t>11/30/2025</a:t>
+              <a:t>12/12/2025</a:t>
             </a:fld>
             <a:endParaRPr lang="en-US"/>
           </a:p>
@@ -6159,7 +6160,7 @@
           <a:p>
             <a:fld id="{8214EFA7-94EC-4BC8-BC85-3E595F55699A}" type="datetimeFigureOut">
               <a:rPr lang="en-US" smtClean="0"/>
-              <a:t>11/30/2025</a:t>
+              <a:t>12/12/2025</a:t>
             </a:fld>
             <a:endParaRPr lang="en-US"/>
           </a:p>
@@ -6902,7 +6903,7 @@
           <a:p>
             <a:fld id="{8214EFA7-94EC-4BC8-BC85-3E595F55699A}" type="datetimeFigureOut">
               <a:rPr lang="en-US" smtClean="0"/>
-              <a:t>11/30/2025</a:t>
+              <a:t>12/12/2025</a:t>
             </a:fld>
             <a:endParaRPr lang="en-US"/>
           </a:p>
@@ -7659,6 +7660,304 @@
         <p:cNvPr id="1" name="">
           <a:extLst>
             <a:ext uri="{FF2B5EF4-FFF2-40B4-BE49-F238E27FC236}">
+              <a16:creationId xmlns:a16="http://schemas.microsoft.com/office/drawing/2014/main" id="{FCA6B338-EE5C-DF32-C21A-76C2E332BA9A}"/>
+            </a:ext>
+          </a:extLst>
+        </p:cNvPr>
+        <p:cNvGrpSpPr/>
+        <p:nvPr/>
+      </p:nvGrpSpPr>
+      <p:grpSpPr>
+        <a:xfrm>
+          <a:off x="0" y="0"/>
+          <a:ext cx="0" cy="0"/>
+          <a:chOff x="0" y="0"/>
+          <a:chExt cx="0" cy="0"/>
+        </a:xfrm>
+      </p:grpSpPr>
+      <p:sp>
+        <p:nvSpPr>
+          <p:cNvPr id="2" name="Title 1">
+            <a:extLst>
+              <a:ext uri="{FF2B5EF4-FFF2-40B4-BE49-F238E27FC236}">
+                <a16:creationId xmlns:a16="http://schemas.microsoft.com/office/drawing/2014/main" id="{35355E19-876D-C276-0AEC-9E54BD99059C}"/>
+              </a:ext>
+            </a:extLst>
+          </p:cNvPr>
+          <p:cNvSpPr>
+            <a:spLocks noGrp="1"/>
+          </p:cNvSpPr>
+          <p:nvPr>
+            <p:ph type="title"/>
+          </p:nvPr>
+        </p:nvSpPr>
+        <p:spPr/>
+        <p:txBody>
+          <a:bodyPr>
+            <a:normAutofit/>
+          </a:bodyPr>
+          <a:lstStyle/>
+          <a:p>
+            <a:r>
+              <a:rPr lang="en-US" b="1" dirty="0"/>
+              <a:t>Create</a:t>
+            </a:r>
+            <a:r>
+              <a:rPr lang="en-US" dirty="0"/>
+              <a:t>/ Aztec &amp; Maya Civilization</a:t>
+            </a:r>
+          </a:p>
+        </p:txBody>
+      </p:sp>
+      <p:sp>
+        <p:nvSpPr>
+          <p:cNvPr id="3" name="Content Placeholder 2">
+            <a:extLst>
+              <a:ext uri="{FF2B5EF4-FFF2-40B4-BE49-F238E27FC236}">
+                <a16:creationId xmlns:a16="http://schemas.microsoft.com/office/drawing/2014/main" id="{E321A689-8533-F1DC-8A29-9B87B7D91440}"/>
+              </a:ext>
+            </a:extLst>
+          </p:cNvPr>
+          <p:cNvSpPr>
+            <a:spLocks noGrp="1"/>
+          </p:cNvSpPr>
+          <p:nvPr>
+            <p:ph idx="1"/>
+          </p:nvPr>
+        </p:nvSpPr>
+        <p:spPr/>
+        <p:txBody>
+          <a:bodyPr/>
+          <a:lstStyle/>
+          <a:p>
+            <a:r>
+              <a:rPr lang="en-US" dirty="0"/>
+              <a:t>In the Maya civilization they used cochineal insects and hematite to create a vibrant red color</a:t>
+            </a:r>
+          </a:p>
+        </p:txBody>
+      </p:sp>
+      <p:pic>
+        <p:nvPicPr>
+          <p:cNvPr id="5" name="Picture 4">
+            <a:extLst>
+              <a:ext uri="{FF2B5EF4-FFF2-40B4-BE49-F238E27FC236}">
+                <a16:creationId xmlns:a16="http://schemas.microsoft.com/office/drawing/2014/main" id="{8E258119-89A8-0CE5-E5D6-43D5BF86B167}"/>
+              </a:ext>
+            </a:extLst>
+          </p:cNvPr>
+          <p:cNvPicPr>
+            <a:picLocks noChangeAspect="1"/>
+          </p:cNvPicPr>
+          <p:nvPr/>
+        </p:nvPicPr>
+        <p:blipFill>
+          <a:blip r:embed="rId3"/>
+          <a:stretch>
+            <a:fillRect/>
+          </a:stretch>
+        </p:blipFill>
+        <p:spPr>
+          <a:xfrm>
+            <a:off x="9773642" y="4704947"/>
+            <a:ext cx="2418358" cy="2153053"/>
+          </a:xfrm>
+          <a:prstGeom prst="rect">
+            <a:avLst/>
+          </a:prstGeom>
+        </p:spPr>
+      </p:pic>
+      <p:sp>
+        <p:nvSpPr>
+          <p:cNvPr id="6" name="Rectangle 5">
+            <a:extLst>
+              <a:ext uri="{FF2B5EF4-FFF2-40B4-BE49-F238E27FC236}">
+                <a16:creationId xmlns:a16="http://schemas.microsoft.com/office/drawing/2014/main" id="{4E57C9B7-81FD-1CE3-38C6-030E9BDD8CB9}"/>
+              </a:ext>
+            </a:extLst>
+          </p:cNvPr>
+          <p:cNvSpPr/>
+          <p:nvPr/>
+        </p:nvSpPr>
+        <p:spPr>
+          <a:xfrm rot="14650361">
+            <a:off x="11196297" y="5921833"/>
+            <a:ext cx="493776" cy="994581"/>
+          </a:xfrm>
+          <a:prstGeom prst="rect">
+            <a:avLst/>
+          </a:prstGeom>
+          <a:noFill/>
+          <a:ln w="31750">
+            <a:solidFill>
+              <a:srgbClr val="C00000"/>
+            </a:solidFill>
+          </a:ln>
+        </p:spPr>
+        <p:style>
+          <a:lnRef idx="2">
+            <a:schemeClr val="accent1">
+              <a:shade val="15000"/>
+            </a:schemeClr>
+          </a:lnRef>
+          <a:fillRef idx="1">
+            <a:schemeClr val="accent1"/>
+          </a:fillRef>
+          <a:effectRef idx="0">
+            <a:schemeClr val="accent1"/>
+          </a:effectRef>
+          <a:fontRef idx="minor">
+            <a:schemeClr val="lt1"/>
+          </a:fontRef>
+        </p:style>
+        <p:txBody>
+          <a:bodyPr rtlCol="0" anchor="ctr"/>
+          <a:lstStyle/>
+          <a:p>
+            <a:pPr algn="ctr"/>
+            <a:endParaRPr lang="en-US"/>
+          </a:p>
+        </p:txBody>
+      </p:sp>
+      <p:sp>
+        <p:nvSpPr>
+          <p:cNvPr id="7" name="TextBox 6">
+            <a:extLst>
+              <a:ext uri="{FF2B5EF4-FFF2-40B4-BE49-F238E27FC236}">
+                <a16:creationId xmlns:a16="http://schemas.microsoft.com/office/drawing/2014/main" id="{D7B16AFF-7DAD-B81F-2612-B7326D38383F}"/>
+              </a:ext>
+            </a:extLst>
+          </p:cNvPr>
+          <p:cNvSpPr txBox="1"/>
+          <p:nvPr/>
+        </p:nvSpPr>
+        <p:spPr>
+          <a:xfrm>
+            <a:off x="9912096" y="576072"/>
+            <a:ext cx="1737360" cy="646331"/>
+          </a:xfrm>
+          <a:prstGeom prst="rect">
+            <a:avLst/>
+          </a:prstGeom>
+          <a:noFill/>
+          <a:ln w="25400">
+            <a:solidFill>
+              <a:schemeClr val="tx1"/>
+            </a:solidFill>
+          </a:ln>
+        </p:spPr>
+        <p:txBody>
+          <a:bodyPr wrap="square" rtlCol="0">
+            <a:spAutoFit/>
+          </a:bodyPr>
+          <a:lstStyle/>
+          <a:p>
+            <a:pPr algn="ctr"/>
+            <a:r>
+              <a:rPr lang="en-US" b="1" dirty="0"/>
+              <a:t>Artificial Dye</a:t>
+            </a:r>
+          </a:p>
+          <a:p>
+            <a:pPr algn="ctr"/>
+            <a:r>
+              <a:rPr lang="en-US" dirty="0">
+                <a:highlight>
+                  <a:srgbClr val="FF0000"/>
+                </a:highlight>
+              </a:rPr>
+              <a:t>Red 40</a:t>
+            </a:r>
+          </a:p>
+        </p:txBody>
+      </p:sp>
+      <p:sp>
+        <p:nvSpPr>
+          <p:cNvPr id="4" name="TextBox 3">
+            <a:extLst>
+              <a:ext uri="{FF2B5EF4-FFF2-40B4-BE49-F238E27FC236}">
+                <a16:creationId xmlns:a16="http://schemas.microsoft.com/office/drawing/2014/main" id="{9A811250-BAE5-9A19-8A19-5AD4F0B7CA71}"/>
+              </a:ext>
+            </a:extLst>
+          </p:cNvPr>
+          <p:cNvSpPr txBox="1"/>
+          <p:nvPr/>
+        </p:nvSpPr>
+        <p:spPr>
+          <a:xfrm>
+            <a:off x="11353801" y="9525"/>
+            <a:ext cx="824258" cy="307777"/>
+          </a:xfrm>
+          <a:prstGeom prst="rect">
+            <a:avLst/>
+          </a:prstGeom>
+          <a:noFill/>
+        </p:spPr>
+        <p:txBody>
+          <a:bodyPr wrap="square" rtlCol="0">
+            <a:spAutoFit/>
+          </a:bodyPr>
+          <a:lstStyle/>
+          <a:p>
+            <a:pPr algn="r"/>
+            <a:r>
+              <a:rPr lang="en-US" sz="1400" dirty="0"/>
+              <a:t>Saumya</a:t>
+            </a:r>
+          </a:p>
+        </p:txBody>
+      </p:sp>
+      <p:pic>
+        <p:nvPicPr>
+          <p:cNvPr id="9" name="Picture 8">
+            <a:extLst>
+              <a:ext uri="{FF2B5EF4-FFF2-40B4-BE49-F238E27FC236}">
+                <a16:creationId xmlns:a16="http://schemas.microsoft.com/office/drawing/2014/main" id="{668C725D-7D46-F60E-A015-9ABE51662FBB}"/>
+              </a:ext>
+            </a:extLst>
+          </p:cNvPr>
+          <p:cNvPicPr>
+            <a:picLocks noChangeAspect="1"/>
+          </p:cNvPicPr>
+          <p:nvPr/>
+        </p:nvPicPr>
+        <p:blipFill>
+          <a:blip r:embed="rId4"/>
+          <a:stretch>
+            <a:fillRect/>
+          </a:stretch>
+        </p:blipFill>
+        <p:spPr>
+          <a:xfrm>
+            <a:off x="1439576" y="3090014"/>
+            <a:ext cx="4390627" cy="2890233"/>
+          </a:xfrm>
+          <a:prstGeom prst="rect">
+            <a:avLst/>
+          </a:prstGeom>
+        </p:spPr>
+      </p:pic>
+    </p:spTree>
+    <p:extLst>
+      <p:ext uri="{BB962C8B-B14F-4D97-AF65-F5344CB8AC3E}">
+        <p14:creationId xmlns:p14="http://schemas.microsoft.com/office/powerpoint/2010/main" val="808702863"/>
+      </p:ext>
+    </p:extLst>
+  </p:cSld>
+  <p:clrMapOvr>
+    <a:masterClrMapping/>
+  </p:clrMapOvr>
+</p:sld>
+</file>
+
+<file path=ppt/slides/slide11.xml><?xml version="1.0" encoding="utf-8"?>
+<p:sld xmlns:a="http://schemas.openxmlformats.org/drawingml/2006/main" xmlns:r="http://schemas.openxmlformats.org/officeDocument/2006/relationships" xmlns:p="http://schemas.openxmlformats.org/presentationml/2006/main">
+  <p:cSld>
+    <p:spTree>
+      <p:nvGrpSpPr>
+        <p:cNvPr id="1" name="">
+          <a:extLst>
+            <a:ext uri="{FF2B5EF4-FFF2-40B4-BE49-F238E27FC236}">
               <a16:creationId xmlns:a16="http://schemas.microsoft.com/office/drawing/2014/main" id="{B7FA057A-F055-3DC1-EEED-486AAA2D6C8B}"/>
             </a:ext>
           </a:extLst>
@@ -7960,7 +8259,7 @@
 </p:sld>
 </file>
 
-<file path=ppt/slides/slide11.xml><?xml version="1.0" encoding="utf-8"?>
+<file path=ppt/slides/slide12.xml><?xml version="1.0" encoding="utf-8"?>
 <p:sld xmlns:a="http://schemas.openxmlformats.org/drawingml/2006/main" xmlns:r="http://schemas.openxmlformats.org/officeDocument/2006/relationships" xmlns:p="http://schemas.openxmlformats.org/presentationml/2006/main">
   <p:cSld>
     <p:spTree>
@@ -8761,7 +9060,7 @@
 </p:sld>
 </file>
 
-<file path=ppt/slides/slide12.xml><?xml version="1.0" encoding="utf-8"?>
+<file path=ppt/slides/slide13.xml><?xml version="1.0" encoding="utf-8"?>
 <p:sld xmlns:a="http://schemas.openxmlformats.org/drawingml/2006/main" xmlns:r="http://schemas.openxmlformats.org/officeDocument/2006/relationships" xmlns:p="http://schemas.openxmlformats.org/presentationml/2006/main">
   <p:cSld>
     <p:spTree>
@@ -9006,7 +9305,7 @@
 </p:sld>
 </file>
 
-<file path=ppt/slides/slide13.xml><?xml version="1.0" encoding="utf-8"?>
+<file path=ppt/slides/slide14.xml><?xml version="1.0" encoding="utf-8"?>
 <p:sld xmlns:a="http://schemas.openxmlformats.org/drawingml/2006/main" xmlns:r="http://schemas.openxmlformats.org/officeDocument/2006/relationships" xmlns:p="http://schemas.openxmlformats.org/presentationml/2006/main">
   <p:cSld>
     <p:spTree>
@@ -9248,7 +9547,7 @@
 </p:sld>
 </file>
 
-<file path=ppt/slides/slide14.xml><?xml version="1.0" encoding="utf-8"?>
+<file path=ppt/slides/slide15.xml><?xml version="1.0" encoding="utf-8"?>
 <p:sld xmlns:a="http://schemas.openxmlformats.org/drawingml/2006/main" xmlns:r="http://schemas.openxmlformats.org/officeDocument/2006/relationships" xmlns:p="http://schemas.openxmlformats.org/presentationml/2006/main">
   <p:cSld>
     <p:spTree>
@@ -9420,7 +9719,7 @@
 </p:sld>
 </file>
 
-<file path=ppt/slides/slide15.xml><?xml version="1.0" encoding="utf-8"?>
+<file path=ppt/slides/slide16.xml><?xml version="1.0" encoding="utf-8"?>
 <p:sld xmlns:a="http://schemas.openxmlformats.org/drawingml/2006/main" xmlns:r="http://schemas.openxmlformats.org/officeDocument/2006/relationships" xmlns:p="http://schemas.openxmlformats.org/presentationml/2006/main">
   <p:cSld>
     <p:spTree>
@@ -9480,7 +9779,7 @@
 </p:sld>
 </file>
 
-<file path=ppt/slides/slide16.xml><?xml version="1.0" encoding="utf-8"?>
+<file path=ppt/slides/slide17.xml><?xml version="1.0" encoding="utf-8"?>
 <p:sld xmlns:a="http://schemas.openxmlformats.org/drawingml/2006/main" xmlns:r="http://schemas.openxmlformats.org/officeDocument/2006/relationships" xmlns:p="http://schemas.openxmlformats.org/presentationml/2006/main" show="0">
   <p:cSld>
     <p:spTree>
@@ -9701,46 +10000,53 @@
             <p:ph idx="1"/>
           </p:nvPr>
         </p:nvSpPr>
-        <p:spPr/>
-        <p:txBody>
-          <a:bodyPr/>
+        <p:spPr>
+          <a:xfrm>
+            <a:off x="677333" y="1675561"/>
+            <a:ext cx="10377763" cy="4645726"/>
+          </a:xfrm>
+        </p:spPr>
+        <p:txBody>
+          <a:bodyPr>
+            <a:normAutofit/>
+          </a:bodyPr>
           <a:lstStyle/>
           <a:p>
             <a:pPr marL="0" indent="0">
               <a:buNone/>
             </a:pPr>
             <a:r>
-              <a:rPr lang="en-US" dirty="0"/>
-              <a:t>Ideas Explored</a:t>
-            </a:r>
-          </a:p>
-          <a:p>
-            <a:r>
-              <a:rPr lang="en-US" sz="2400" dirty="0"/>
+              <a:rPr lang="en-US" sz="4400" dirty="0"/>
+              <a:t>Ideas Explored before choosing our project:</a:t>
+            </a:r>
+          </a:p>
+          <a:p>
+            <a:r>
+              <a:rPr lang="en-US" sz="3200" dirty="0"/>
               <a:t>Robotic Arm in Field of Archaeology </a:t>
             </a:r>
           </a:p>
           <a:p>
             <a:r>
-              <a:rPr lang="en-US" sz="2400" dirty="0"/>
+              <a:rPr lang="en-US" sz="3200" dirty="0"/>
               <a:t>LIDAR / SONAR</a:t>
             </a:r>
           </a:p>
           <a:p>
             <a:r>
-              <a:rPr lang="en-US" sz="2400" dirty="0"/>
+              <a:rPr lang="en-US" sz="3200" dirty="0"/>
               <a:t>Natural Cooling / Wind Tower</a:t>
             </a:r>
           </a:p>
           <a:p>
             <a:r>
-              <a:rPr lang="en-US" sz="2400" dirty="0"/>
+              <a:rPr lang="en-US" sz="3200" dirty="0"/>
               <a:t>Artificial Dyes in Jewelry</a:t>
             </a:r>
           </a:p>
           <a:p>
             <a:r>
-              <a:rPr lang="en-US" sz="2400" b="1" dirty="0"/>
+              <a:rPr lang="en-US" sz="4000" b="1" dirty="0"/>
               <a:t>Artificial Dyes in Food</a:t>
             </a:r>
           </a:p>
@@ -10090,6 +10396,122 @@
 </file>
 
 <file path=ppt/slides/slide4.xml><?xml version="1.0" encoding="utf-8"?>
+<p:sld xmlns:a="http://schemas.openxmlformats.org/drawingml/2006/main" xmlns:r="http://schemas.openxmlformats.org/officeDocument/2006/relationships" xmlns:p="http://schemas.openxmlformats.org/presentationml/2006/main">
+  <p:cSld>
+    <p:spTree>
+      <p:nvGrpSpPr>
+        <p:cNvPr id="1" name=""/>
+        <p:cNvGrpSpPr/>
+        <p:nvPr/>
+      </p:nvGrpSpPr>
+      <p:grpSpPr>
+        <a:xfrm>
+          <a:off x="0" y="0"/>
+          <a:ext cx="0" cy="0"/>
+          <a:chOff x="0" y="0"/>
+          <a:chExt cx="0" cy="0"/>
+        </a:xfrm>
+      </p:grpSpPr>
+      <p:sp>
+        <p:nvSpPr>
+          <p:cNvPr id="2" name="Title 1">
+            <a:extLst>
+              <a:ext uri="{FF2B5EF4-FFF2-40B4-BE49-F238E27FC236}">
+                <a16:creationId xmlns:a16="http://schemas.microsoft.com/office/drawing/2014/main" id="{8DBFFE2B-ABD0-9877-AC89-F759EEABA7C6}"/>
+              </a:ext>
+            </a:extLst>
+          </p:cNvPr>
+          <p:cNvSpPr>
+            <a:spLocks noGrp="1"/>
+          </p:cNvSpPr>
+          <p:nvPr>
+            <p:ph type="title"/>
+          </p:nvPr>
+        </p:nvSpPr>
+        <p:spPr/>
+        <p:txBody>
+          <a:bodyPr/>
+          <a:lstStyle/>
+          <a:p>
+            <a:r>
+              <a:rPr lang="en-US" b="1" dirty="0"/>
+              <a:t>Identify</a:t>
+            </a:r>
+            <a:r>
+              <a:rPr lang="en-US" dirty="0"/>
+              <a:t> / Problem Details</a:t>
+            </a:r>
+          </a:p>
+        </p:txBody>
+      </p:sp>
+      <p:sp>
+        <p:nvSpPr>
+          <p:cNvPr id="3" name="Content Placeholder 2">
+            <a:extLst>
+              <a:ext uri="{FF2B5EF4-FFF2-40B4-BE49-F238E27FC236}">
+                <a16:creationId xmlns:a16="http://schemas.microsoft.com/office/drawing/2014/main" id="{E06C3D87-5D2C-BDBB-596B-16C60A4BCFEE}"/>
+              </a:ext>
+            </a:extLst>
+          </p:cNvPr>
+          <p:cNvSpPr>
+            <a:spLocks noGrp="1"/>
+          </p:cNvSpPr>
+          <p:nvPr>
+            <p:ph idx="1"/>
+          </p:nvPr>
+        </p:nvSpPr>
+        <p:spPr>
+          <a:xfrm>
+            <a:off x="677333" y="1717483"/>
+            <a:ext cx="10780497" cy="4323880"/>
+          </a:xfrm>
+        </p:spPr>
+        <p:txBody>
+          <a:bodyPr>
+            <a:noAutofit/>
+          </a:bodyPr>
+          <a:lstStyle/>
+          <a:p>
+            <a:pPr algn="just"/>
+            <a:r>
+              <a:rPr lang="en-US" sz="2400" dirty="0"/>
+              <a:t>Many synthetic dyes used today can pollute water and soil, which can harm the environment and the places where fossils and archaeological artifacts are buried.​​</a:t>
+            </a:r>
+          </a:p>
+          <a:p>
+            <a:r>
+              <a:rPr lang="en-US" sz="2400" dirty="0"/>
+              <a:t>Civilization moved away from natural dyes because of cost, consistency, and availability of natural ingredients </a:t>
+            </a:r>
+          </a:p>
+          <a:p>
+            <a:r>
+              <a:rPr lang="en-US" sz="2400" dirty="0"/>
+              <a:t>Our team wants to find safer natural dyes that still give bright colors, using gentle ingredients and methods inspired by how ancient civilizations dyed their textiles, and using modern technology and AI to make these natural colors more consistent and affordable today</a:t>
+            </a:r>
+          </a:p>
+          <a:p>
+            <a:r>
+              <a:rPr lang="en-US" sz="2400" dirty="0"/>
+              <a:t>By testing and improving natural dye methods, we aim to reduce chemical pollution from synthetic dyes and help protect underground layers where future archaeologists and paleontologists will work.</a:t>
+            </a:r>
+          </a:p>
+        </p:txBody>
+      </p:sp>
+    </p:spTree>
+    <p:extLst>
+      <p:ext uri="{BB962C8B-B14F-4D97-AF65-F5344CB8AC3E}">
+        <p14:creationId xmlns:p14="http://schemas.microsoft.com/office/powerpoint/2010/main" val="342489871"/>
+      </p:ext>
+    </p:extLst>
+  </p:cSld>
+  <p:clrMapOvr>
+    <a:masterClrMapping/>
+  </p:clrMapOvr>
+</p:sld>
+</file>
+
+<file path=ppt/slides/slide5.xml><?xml version="1.0" encoding="utf-8"?>
 <p:sld xmlns:a="http://schemas.openxmlformats.org/drawingml/2006/main" xmlns:r="http://schemas.openxmlformats.org/officeDocument/2006/relationships" xmlns:p="http://schemas.openxmlformats.org/presentationml/2006/main">
   <p:cSld>
     <p:spTree>
@@ -10212,6 +10634,21 @@
               <a:t>Maintain color consistency using AI color detection</a:t>
             </a:r>
           </a:p>
+          <a:p>
+            <a:r>
+              <a:rPr lang="en-US" dirty="0"/>
+              <a:t>By testing and improving natural dye methods, we aim to reduce chemical pollution from synthetic dyes and help protect underground layers where future archaeologists and paleontologists will work.</a:t>
+            </a:r>
+          </a:p>
+          <a:p>
+            <a:r>
+              <a:rPr lang="en-US" dirty="0"/>
+              <a:t> We used AI tools to look for patterns and recommend which recipes give the most consistent color. This helps make natural dyes more reliable and less expensive, so more people can use them instead of synthetic dyes.”</a:t>
+            </a:r>
+          </a:p>
+          <a:p>
+            <a:endParaRPr lang="en-US" dirty="0"/>
+          </a:p>
         </p:txBody>
       </p:sp>
       <p:sp>
@@ -10315,7 +10752,7 @@
 </p:sld>
 </file>
 
-<file path=ppt/slides/slide5.xml><?xml version="1.0" encoding="utf-8"?>
+<file path=ppt/slides/slide6.xml><?xml version="1.0" encoding="utf-8"?>
 <p:sld xmlns:a="http://schemas.openxmlformats.org/drawingml/2006/main" xmlns:r="http://schemas.openxmlformats.org/officeDocument/2006/relationships" xmlns:p="http://schemas.openxmlformats.org/presentationml/2006/main">
   <p:cSld>
     <p:spTree>
@@ -10596,7 +11033,7 @@
 </p:sld>
 </file>
 
-<file path=ppt/slides/slide6.xml><?xml version="1.0" encoding="utf-8"?>
+<file path=ppt/slides/slide7.xml><?xml version="1.0" encoding="utf-8"?>
 <p:sld xmlns:a="http://schemas.openxmlformats.org/drawingml/2006/main" xmlns:r="http://schemas.openxmlformats.org/officeDocument/2006/relationships" xmlns:p="http://schemas.openxmlformats.org/presentationml/2006/main">
   <p:cSld>
     <p:spTree>
@@ -10953,7 +11390,7 @@
 </p:sld>
 </file>
 
-<file path=ppt/slides/slide7.xml><?xml version="1.0" encoding="utf-8"?>
+<file path=ppt/slides/slide8.xml><?xml version="1.0" encoding="utf-8"?>
 <p:sld xmlns:a="http://schemas.openxmlformats.org/drawingml/2006/main" xmlns:r="http://schemas.openxmlformats.org/officeDocument/2006/relationships" xmlns:p="http://schemas.openxmlformats.org/presentationml/2006/main">
   <p:cSld>
     <p:spTree>
@@ -11277,7 +11714,7 @@
 </p:sld>
 </file>
 
-<file path=ppt/slides/slide8.xml><?xml version="1.0" encoding="utf-8"?>
+<file path=ppt/slides/slide9.xml><?xml version="1.0" encoding="utf-8"?>
 <p:sld xmlns:a="http://schemas.openxmlformats.org/drawingml/2006/main" xmlns:r="http://schemas.openxmlformats.org/officeDocument/2006/relationships" xmlns:p="http://schemas.openxmlformats.org/presentationml/2006/main">
   <p:cSld>
     <p:spTree>
@@ -11566,304 +12003,6 @@
     <p:extLst>
       <p:ext uri="{BB962C8B-B14F-4D97-AF65-F5344CB8AC3E}">
         <p14:creationId xmlns:p14="http://schemas.microsoft.com/office/powerpoint/2010/main" val="3495656997"/>
-      </p:ext>
-    </p:extLst>
-  </p:cSld>
-  <p:clrMapOvr>
-    <a:masterClrMapping/>
-  </p:clrMapOvr>
-</p:sld>
-</file>
-
-<file path=ppt/slides/slide9.xml><?xml version="1.0" encoding="utf-8"?>
-<p:sld xmlns:a="http://schemas.openxmlformats.org/drawingml/2006/main" xmlns:r="http://schemas.openxmlformats.org/officeDocument/2006/relationships" xmlns:p="http://schemas.openxmlformats.org/presentationml/2006/main">
-  <p:cSld>
-    <p:spTree>
-      <p:nvGrpSpPr>
-        <p:cNvPr id="1" name="">
-          <a:extLst>
-            <a:ext uri="{FF2B5EF4-FFF2-40B4-BE49-F238E27FC236}">
-              <a16:creationId xmlns:a16="http://schemas.microsoft.com/office/drawing/2014/main" id="{FCA6B338-EE5C-DF32-C21A-76C2E332BA9A}"/>
-            </a:ext>
-          </a:extLst>
-        </p:cNvPr>
-        <p:cNvGrpSpPr/>
-        <p:nvPr/>
-      </p:nvGrpSpPr>
-      <p:grpSpPr>
-        <a:xfrm>
-          <a:off x="0" y="0"/>
-          <a:ext cx="0" cy="0"/>
-          <a:chOff x="0" y="0"/>
-          <a:chExt cx="0" cy="0"/>
-        </a:xfrm>
-      </p:grpSpPr>
-      <p:sp>
-        <p:nvSpPr>
-          <p:cNvPr id="2" name="Title 1">
-            <a:extLst>
-              <a:ext uri="{FF2B5EF4-FFF2-40B4-BE49-F238E27FC236}">
-                <a16:creationId xmlns:a16="http://schemas.microsoft.com/office/drawing/2014/main" id="{35355E19-876D-C276-0AEC-9E54BD99059C}"/>
-              </a:ext>
-            </a:extLst>
-          </p:cNvPr>
-          <p:cNvSpPr>
-            <a:spLocks noGrp="1"/>
-          </p:cNvSpPr>
-          <p:nvPr>
-            <p:ph type="title"/>
-          </p:nvPr>
-        </p:nvSpPr>
-        <p:spPr/>
-        <p:txBody>
-          <a:bodyPr>
-            <a:normAutofit/>
-          </a:bodyPr>
-          <a:lstStyle/>
-          <a:p>
-            <a:r>
-              <a:rPr lang="en-US" b="1" dirty="0"/>
-              <a:t>Create</a:t>
-            </a:r>
-            <a:r>
-              <a:rPr lang="en-US" dirty="0"/>
-              <a:t>/ Aztec &amp; Maya Civilization</a:t>
-            </a:r>
-          </a:p>
-        </p:txBody>
-      </p:sp>
-      <p:sp>
-        <p:nvSpPr>
-          <p:cNvPr id="3" name="Content Placeholder 2">
-            <a:extLst>
-              <a:ext uri="{FF2B5EF4-FFF2-40B4-BE49-F238E27FC236}">
-                <a16:creationId xmlns:a16="http://schemas.microsoft.com/office/drawing/2014/main" id="{E321A689-8533-F1DC-8A29-9B87B7D91440}"/>
-              </a:ext>
-            </a:extLst>
-          </p:cNvPr>
-          <p:cNvSpPr>
-            <a:spLocks noGrp="1"/>
-          </p:cNvSpPr>
-          <p:nvPr>
-            <p:ph idx="1"/>
-          </p:nvPr>
-        </p:nvSpPr>
-        <p:spPr/>
-        <p:txBody>
-          <a:bodyPr/>
-          <a:lstStyle/>
-          <a:p>
-            <a:r>
-              <a:rPr lang="en-US" dirty="0"/>
-              <a:t>In the Maya civilization they used cochineal insects and hematite to create a vibrant red color</a:t>
-            </a:r>
-          </a:p>
-        </p:txBody>
-      </p:sp>
-      <p:pic>
-        <p:nvPicPr>
-          <p:cNvPr id="5" name="Picture 4">
-            <a:extLst>
-              <a:ext uri="{FF2B5EF4-FFF2-40B4-BE49-F238E27FC236}">
-                <a16:creationId xmlns:a16="http://schemas.microsoft.com/office/drawing/2014/main" id="{8E258119-89A8-0CE5-E5D6-43D5BF86B167}"/>
-              </a:ext>
-            </a:extLst>
-          </p:cNvPr>
-          <p:cNvPicPr>
-            <a:picLocks noChangeAspect="1"/>
-          </p:cNvPicPr>
-          <p:nvPr/>
-        </p:nvPicPr>
-        <p:blipFill>
-          <a:blip r:embed="rId3"/>
-          <a:stretch>
-            <a:fillRect/>
-          </a:stretch>
-        </p:blipFill>
-        <p:spPr>
-          <a:xfrm>
-            <a:off x="9773642" y="4704947"/>
-            <a:ext cx="2418358" cy="2153053"/>
-          </a:xfrm>
-          <a:prstGeom prst="rect">
-            <a:avLst/>
-          </a:prstGeom>
-        </p:spPr>
-      </p:pic>
-      <p:sp>
-        <p:nvSpPr>
-          <p:cNvPr id="6" name="Rectangle 5">
-            <a:extLst>
-              <a:ext uri="{FF2B5EF4-FFF2-40B4-BE49-F238E27FC236}">
-                <a16:creationId xmlns:a16="http://schemas.microsoft.com/office/drawing/2014/main" id="{4E57C9B7-81FD-1CE3-38C6-030E9BDD8CB9}"/>
-              </a:ext>
-            </a:extLst>
-          </p:cNvPr>
-          <p:cNvSpPr/>
-          <p:nvPr/>
-        </p:nvSpPr>
-        <p:spPr>
-          <a:xfrm rot="14650361">
-            <a:off x="11196297" y="5921833"/>
-            <a:ext cx="493776" cy="994581"/>
-          </a:xfrm>
-          <a:prstGeom prst="rect">
-            <a:avLst/>
-          </a:prstGeom>
-          <a:noFill/>
-          <a:ln w="31750">
-            <a:solidFill>
-              <a:srgbClr val="C00000"/>
-            </a:solidFill>
-          </a:ln>
-        </p:spPr>
-        <p:style>
-          <a:lnRef idx="2">
-            <a:schemeClr val="accent1">
-              <a:shade val="15000"/>
-            </a:schemeClr>
-          </a:lnRef>
-          <a:fillRef idx="1">
-            <a:schemeClr val="accent1"/>
-          </a:fillRef>
-          <a:effectRef idx="0">
-            <a:schemeClr val="accent1"/>
-          </a:effectRef>
-          <a:fontRef idx="minor">
-            <a:schemeClr val="lt1"/>
-          </a:fontRef>
-        </p:style>
-        <p:txBody>
-          <a:bodyPr rtlCol="0" anchor="ctr"/>
-          <a:lstStyle/>
-          <a:p>
-            <a:pPr algn="ctr"/>
-            <a:endParaRPr lang="en-US"/>
-          </a:p>
-        </p:txBody>
-      </p:sp>
-      <p:sp>
-        <p:nvSpPr>
-          <p:cNvPr id="7" name="TextBox 6">
-            <a:extLst>
-              <a:ext uri="{FF2B5EF4-FFF2-40B4-BE49-F238E27FC236}">
-                <a16:creationId xmlns:a16="http://schemas.microsoft.com/office/drawing/2014/main" id="{D7B16AFF-7DAD-B81F-2612-B7326D38383F}"/>
-              </a:ext>
-            </a:extLst>
-          </p:cNvPr>
-          <p:cNvSpPr txBox="1"/>
-          <p:nvPr/>
-        </p:nvSpPr>
-        <p:spPr>
-          <a:xfrm>
-            <a:off x="9912096" y="576072"/>
-            <a:ext cx="1737360" cy="646331"/>
-          </a:xfrm>
-          <a:prstGeom prst="rect">
-            <a:avLst/>
-          </a:prstGeom>
-          <a:noFill/>
-          <a:ln w="25400">
-            <a:solidFill>
-              <a:schemeClr val="tx1"/>
-            </a:solidFill>
-          </a:ln>
-        </p:spPr>
-        <p:txBody>
-          <a:bodyPr wrap="square" rtlCol="0">
-            <a:spAutoFit/>
-          </a:bodyPr>
-          <a:lstStyle/>
-          <a:p>
-            <a:pPr algn="ctr"/>
-            <a:r>
-              <a:rPr lang="en-US" b="1" dirty="0"/>
-              <a:t>Artificial Dye</a:t>
-            </a:r>
-          </a:p>
-          <a:p>
-            <a:pPr algn="ctr"/>
-            <a:r>
-              <a:rPr lang="en-US" dirty="0">
-                <a:highlight>
-                  <a:srgbClr val="FF0000"/>
-                </a:highlight>
-              </a:rPr>
-              <a:t>Red 40</a:t>
-            </a:r>
-          </a:p>
-        </p:txBody>
-      </p:sp>
-      <p:sp>
-        <p:nvSpPr>
-          <p:cNvPr id="4" name="TextBox 3">
-            <a:extLst>
-              <a:ext uri="{FF2B5EF4-FFF2-40B4-BE49-F238E27FC236}">
-                <a16:creationId xmlns:a16="http://schemas.microsoft.com/office/drawing/2014/main" id="{9A811250-BAE5-9A19-8A19-5AD4F0B7CA71}"/>
-              </a:ext>
-            </a:extLst>
-          </p:cNvPr>
-          <p:cNvSpPr txBox="1"/>
-          <p:nvPr/>
-        </p:nvSpPr>
-        <p:spPr>
-          <a:xfrm>
-            <a:off x="11353801" y="9525"/>
-            <a:ext cx="824258" cy="307777"/>
-          </a:xfrm>
-          <a:prstGeom prst="rect">
-            <a:avLst/>
-          </a:prstGeom>
-          <a:noFill/>
-        </p:spPr>
-        <p:txBody>
-          <a:bodyPr wrap="square" rtlCol="0">
-            <a:spAutoFit/>
-          </a:bodyPr>
-          <a:lstStyle/>
-          <a:p>
-            <a:pPr algn="r"/>
-            <a:r>
-              <a:rPr lang="en-US" sz="1400" dirty="0"/>
-              <a:t>Saumya</a:t>
-            </a:r>
-          </a:p>
-        </p:txBody>
-      </p:sp>
-      <p:pic>
-        <p:nvPicPr>
-          <p:cNvPr id="9" name="Picture 8">
-            <a:extLst>
-              <a:ext uri="{FF2B5EF4-FFF2-40B4-BE49-F238E27FC236}">
-                <a16:creationId xmlns:a16="http://schemas.microsoft.com/office/drawing/2014/main" id="{668C725D-7D46-F60E-A015-9ABE51662FBB}"/>
-              </a:ext>
-            </a:extLst>
-          </p:cNvPr>
-          <p:cNvPicPr>
-            <a:picLocks noChangeAspect="1"/>
-          </p:cNvPicPr>
-          <p:nvPr/>
-        </p:nvPicPr>
-        <p:blipFill>
-          <a:blip r:embed="rId4"/>
-          <a:stretch>
-            <a:fillRect/>
-          </a:stretch>
-        </p:blipFill>
-        <p:spPr>
-          <a:xfrm>
-            <a:off x="1439576" y="3090014"/>
-            <a:ext cx="4390627" cy="2890233"/>
-          </a:xfrm>
-          <a:prstGeom prst="rect">
-            <a:avLst/>
-          </a:prstGeom>
-        </p:spPr>
-      </p:pic>
-    </p:spTree>
-    <p:extLst>
-      <p:ext uri="{BB962C8B-B14F-4D97-AF65-F5344CB8AC3E}">
-        <p14:creationId xmlns:p14="http://schemas.microsoft.com/office/powerpoint/2010/main" val="808702863"/>
       </p:ext>
     </p:extLst>
   </p:cSld>

</xml_diff>